<commit_message>
Updated backup client info
</commit_message>
<xml_diff>
--- a/workshop_event/Pen-Testing Cloud REST APIs - 2025.pptx
+++ b/workshop_event/Pen-Testing Cloud REST APIs - 2025.pptx
@@ -224,7 +224,7 @@
           <a:p>
             <a:fld id="{B2537219-CD8D-4BE3-A4DF-4D632A31A097}" type="datetimeFigureOut">
               <a:rPr lang="en-US" smtClean="0"/>
-              <a:t>6/28/2025</a:t>
+              <a:t>6/29/2025</a:t>
             </a:fld>
             <a:endParaRPr lang="en-US"/>
           </a:p>
@@ -736,7 +736,7 @@
           <a:p>
             <a:fld id="{C2270EAA-1E86-45EE-8317-11D72D8937B4}" type="datetimeFigureOut">
               <a:rPr lang="en-US" smtClean="0"/>
-              <a:t>6/28/2025</a:t>
+              <a:t>6/29/2025</a:t>
             </a:fld>
             <a:endParaRPr lang="en-US"/>
           </a:p>
@@ -934,7 +934,7 @@
           <a:p>
             <a:fld id="{C2270EAA-1E86-45EE-8317-11D72D8937B4}" type="datetimeFigureOut">
               <a:rPr lang="en-US" smtClean="0"/>
-              <a:t>6/28/2025</a:t>
+              <a:t>6/29/2025</a:t>
             </a:fld>
             <a:endParaRPr lang="en-US"/>
           </a:p>
@@ -1142,7 +1142,7 @@
           <a:p>
             <a:fld id="{C2270EAA-1E86-45EE-8317-11D72D8937B4}" type="datetimeFigureOut">
               <a:rPr lang="en-US" smtClean="0"/>
-              <a:t>6/28/2025</a:t>
+              <a:t>6/29/2025</a:t>
             </a:fld>
             <a:endParaRPr lang="en-US"/>
           </a:p>
@@ -1492,7 +1492,7 @@
           <a:p>
             <a:fld id="{C2270EAA-1E86-45EE-8317-11D72D8937B4}" type="datetimeFigureOut">
               <a:rPr lang="en-US" smtClean="0"/>
-              <a:t>6/28/2025</a:t>
+              <a:t>6/29/2025</a:t>
             </a:fld>
             <a:endParaRPr lang="en-US"/>
           </a:p>
@@ -1767,7 +1767,7 @@
           <a:p>
             <a:fld id="{C2270EAA-1E86-45EE-8317-11D72D8937B4}" type="datetimeFigureOut">
               <a:rPr lang="en-US" smtClean="0"/>
-              <a:t>6/28/2025</a:t>
+              <a:t>6/29/2025</a:t>
             </a:fld>
             <a:endParaRPr lang="en-US"/>
           </a:p>
@@ -2032,7 +2032,7 @@
           <a:p>
             <a:fld id="{C2270EAA-1E86-45EE-8317-11D72D8937B4}" type="datetimeFigureOut">
               <a:rPr lang="en-US" smtClean="0"/>
-              <a:t>6/28/2025</a:t>
+              <a:t>6/29/2025</a:t>
             </a:fld>
             <a:endParaRPr lang="en-US"/>
           </a:p>
@@ -2444,7 +2444,7 @@
           <a:p>
             <a:fld id="{C2270EAA-1E86-45EE-8317-11D72D8937B4}" type="datetimeFigureOut">
               <a:rPr lang="en-US" smtClean="0"/>
-              <a:t>6/28/2025</a:t>
+              <a:t>6/29/2025</a:t>
             </a:fld>
             <a:endParaRPr lang="en-US"/>
           </a:p>
@@ -2585,7 +2585,7 @@
           <a:p>
             <a:fld id="{C2270EAA-1E86-45EE-8317-11D72D8937B4}" type="datetimeFigureOut">
               <a:rPr lang="en-US" smtClean="0"/>
-              <a:t>6/28/2025</a:t>
+              <a:t>6/29/2025</a:t>
             </a:fld>
             <a:endParaRPr lang="en-US"/>
           </a:p>
@@ -2698,7 +2698,7 @@
           <a:p>
             <a:fld id="{C2270EAA-1E86-45EE-8317-11D72D8937B4}" type="datetimeFigureOut">
               <a:rPr lang="en-US" smtClean="0"/>
-              <a:t>6/28/2025</a:t>
+              <a:t>6/29/2025</a:t>
             </a:fld>
             <a:endParaRPr lang="en-US"/>
           </a:p>
@@ -3009,7 +3009,7 @@
           <a:p>
             <a:fld id="{C2270EAA-1E86-45EE-8317-11D72D8937B4}" type="datetimeFigureOut">
               <a:rPr lang="en-US" smtClean="0"/>
-              <a:t>6/28/2025</a:t>
+              <a:t>6/29/2025</a:t>
             </a:fld>
             <a:endParaRPr lang="en-US"/>
           </a:p>
@@ -3297,7 +3297,7 @@
           <a:p>
             <a:fld id="{C2270EAA-1E86-45EE-8317-11D72D8937B4}" type="datetimeFigureOut">
               <a:rPr lang="en-US" smtClean="0"/>
-              <a:t>6/28/2025</a:t>
+              <a:t>6/29/2025</a:t>
             </a:fld>
             <a:endParaRPr lang="en-US"/>
           </a:p>
@@ -3538,7 +3538,7 @@
           <a:p>
             <a:fld id="{C2270EAA-1E86-45EE-8317-11D72D8937B4}" type="datetimeFigureOut">
               <a:rPr lang="en-US" smtClean="0"/>
-              <a:t>6/28/2025</a:t>
+              <a:t>6/29/2025</a:t>
             </a:fld>
             <a:endParaRPr lang="en-US"/>
           </a:p>
@@ -7744,7 +7744,7 @@
                 </a:solidFill>
                 <a:latin typeface="Arial"/>
               </a:rPr>
-              <a:t>ssh client@</a:t>
+              <a:t>ssh workshop@</a:t>
             </a:r>
             <a:r>
               <a:rPr lang="en-US" sz="3200" spc="-1" dirty="0">
@@ -7778,16 +7778,16 @@
                 </a:solidFill>
                 <a:latin typeface="Arial"/>
               </a:rPr>
-              <a:t>Password: </a:t>
-            </a:r>
-            <a:r>
-              <a:rPr lang="en-US" sz="3200" spc="-1" dirty="0" err="1">
+              <a:t>Password</a:t>
+            </a:r>
+            <a:r>
+              <a:rPr lang="en-US" sz="3200" spc="-1">
                 <a:solidFill>
                   <a:schemeClr val="dk2"/>
                 </a:solidFill>
                 <a:latin typeface="Arial"/>
               </a:rPr>
-              <a:t>hopeitworks</a:t>
+              <a:t>: password</a:t>
             </a:r>
             <a:endParaRPr lang="en-US" sz="3200" spc="-1" dirty="0">
               <a:solidFill>

</xml_diff>